<commit_message>
Create what is a custom type slide
</commit_message>
<xml_diff>
--- a/Custom_types_r_functions/ct_rf.pptx
+++ b/Custom_types_r_functions/ct_rf.pptx
@@ -3502,7 +3502,10 @@
           <a:bodyPr/>
           <a:lstStyle/>
           <a:p>
-            <a:endParaRPr lang="en-US"/>
+            <a:r>
+              <a:rPr lang="en-US" dirty="0"/>
+              <a:t>What is a custom type declaration?</a:t>
+            </a:r>
           </a:p>
         </p:txBody>
       </p:sp>
@@ -3522,15 +3525,125 @@
             <p:ph idx="1"/>
           </p:nvPr>
         </p:nvSpPr>
-        <p:spPr/>
-        <p:txBody>
-          <a:bodyPr/>
-          <a:lstStyle/>
-          <a:p>
-            <a:endParaRPr lang="en-US"/>
-          </a:p>
-        </p:txBody>
-      </p:sp>
+        <p:spPr>
+          <a:xfrm>
+            <a:off x="3489258" y="0"/>
+            <a:ext cx="7315200" cy="2101932"/>
+          </a:xfrm>
+        </p:spPr>
+        <p:txBody>
+          <a:bodyPr/>
+          <a:lstStyle/>
+          <a:p>
+            <a:r>
+              <a:rPr lang="en-US" dirty="0"/>
+              <a:t>We define a custom variable type.</a:t>
+            </a:r>
+          </a:p>
+          <a:p>
+            <a:r>
+              <a:rPr lang="en-US" dirty="0"/>
+              <a:t>Example: </a:t>
+            </a:r>
+          </a:p>
+          <a:p>
+            <a:pPr marL="0" indent="0">
+              <a:buNone/>
+            </a:pPr>
+            <a:endParaRPr lang="en-US" dirty="0"/>
+          </a:p>
+        </p:txBody>
+      </p:sp>
+      <p:pic>
+        <p:nvPicPr>
+          <p:cNvPr id="5" name="Picture 4">
+            <a:extLst>
+              <a:ext uri="{FF2B5EF4-FFF2-40B4-BE49-F238E27FC236}">
+                <a16:creationId xmlns:a16="http://schemas.microsoft.com/office/drawing/2014/main" id="{697D0ACB-D08E-415A-A529-B6F84B9D44FC}"/>
+              </a:ext>
+            </a:extLst>
+          </p:cNvPr>
+          <p:cNvPicPr>
+            <a:picLocks noChangeAspect="1"/>
+          </p:cNvPicPr>
+          <p:nvPr/>
+        </p:nvPicPr>
+        <p:blipFill>
+          <a:blip r:embed="rId2"/>
+          <a:stretch>
+            <a:fillRect/>
+          </a:stretch>
+        </p:blipFill>
+        <p:spPr>
+          <a:xfrm>
+            <a:off x="3656738" y="1200946"/>
+            <a:ext cx="4851932" cy="2566601"/>
+          </a:xfrm>
+          <a:prstGeom prst="rect">
+            <a:avLst/>
+          </a:prstGeom>
+        </p:spPr>
+      </p:pic>
+      <p:pic>
+        <p:nvPicPr>
+          <p:cNvPr id="7" name="Picture 6">
+            <a:extLst>
+              <a:ext uri="{FF2B5EF4-FFF2-40B4-BE49-F238E27FC236}">
+                <a16:creationId xmlns:a16="http://schemas.microsoft.com/office/drawing/2014/main" id="{ED64BA9B-523D-4850-8F4A-ED17C8678EF0}"/>
+              </a:ext>
+            </a:extLst>
+          </p:cNvPr>
+          <p:cNvPicPr>
+            <a:picLocks noChangeAspect="1"/>
+          </p:cNvPicPr>
+          <p:nvPr/>
+        </p:nvPicPr>
+        <p:blipFill>
+          <a:blip r:embed="rId3"/>
+          <a:stretch>
+            <a:fillRect/>
+          </a:stretch>
+        </p:blipFill>
+        <p:spPr>
+          <a:xfrm>
+            <a:off x="3656738" y="3816150"/>
+            <a:ext cx="4851932" cy="2834031"/>
+          </a:xfrm>
+          <a:prstGeom prst="rect">
+            <a:avLst/>
+          </a:prstGeom>
+        </p:spPr>
+      </p:pic>
+      <p:pic>
+        <p:nvPicPr>
+          <p:cNvPr id="9" name="Picture 8">
+            <a:extLst>
+              <a:ext uri="{FF2B5EF4-FFF2-40B4-BE49-F238E27FC236}">
+                <a16:creationId xmlns:a16="http://schemas.microsoft.com/office/drawing/2014/main" id="{BB675703-5022-4E0D-B283-64DE2CFBB01F}"/>
+              </a:ext>
+            </a:extLst>
+          </p:cNvPr>
+          <p:cNvPicPr>
+            <a:picLocks noChangeAspect="1"/>
+          </p:cNvPicPr>
+          <p:nvPr/>
+        </p:nvPicPr>
+        <p:blipFill>
+          <a:blip r:embed="rId4"/>
+          <a:stretch>
+            <a:fillRect/>
+          </a:stretch>
+        </p:blipFill>
+        <p:spPr>
+          <a:xfrm>
+            <a:off x="493816" y="4090165"/>
+            <a:ext cx="2286000" cy="2286000"/>
+          </a:xfrm>
+          <a:prstGeom prst="rect">
+            <a:avLst/>
+          </a:prstGeom>
+        </p:spPr>
+      </p:pic>
     </p:spTree>
     <p:extLst>
       <p:ext uri="{BB962C8B-B14F-4D97-AF65-F5344CB8AC3E}">

</xml_diff>

<commit_message>
Create receiver functions slide
</commit_message>
<xml_diff>
--- a/Custom_types_r_functions/ct_rf.pptx
+++ b/Custom_types_r_functions/ct_rf.pptx
@@ -7,6 +7,7 @@
   <p:sldIdLst>
     <p:sldId id="256" r:id="rId2"/>
     <p:sldId id="257" r:id="rId3"/>
+    <p:sldId id="258" r:id="rId4"/>
   </p:sldIdLst>
   <p:sldSz cx="12192000" cy="6858000"/>
   <p:notesSz cx="6858000" cy="9144000"/>
@@ -3657,6 +3658,153 @@
 </p:sld>
 </file>
 
+<file path=ppt/slides/slide3.xml><?xml version="1.0" encoding="utf-8"?>
+<p:sld xmlns:a="http://schemas.openxmlformats.org/drawingml/2006/main" xmlns:r="http://schemas.openxmlformats.org/officeDocument/2006/relationships" xmlns:p="http://schemas.openxmlformats.org/presentationml/2006/main">
+  <p:cSld>
+    <p:spTree>
+      <p:nvGrpSpPr>
+        <p:cNvPr id="1" name=""/>
+        <p:cNvGrpSpPr/>
+        <p:nvPr/>
+      </p:nvGrpSpPr>
+      <p:grpSpPr>
+        <a:xfrm>
+          <a:off x="0" y="0"/>
+          <a:ext cx="0" cy="0"/>
+          <a:chOff x="0" y="0"/>
+          <a:chExt cx="0" cy="0"/>
+        </a:xfrm>
+      </p:grpSpPr>
+      <p:sp>
+        <p:nvSpPr>
+          <p:cNvPr id="2" name="Title 1">
+            <a:extLst>
+              <a:ext uri="{FF2B5EF4-FFF2-40B4-BE49-F238E27FC236}">
+                <a16:creationId xmlns:a16="http://schemas.microsoft.com/office/drawing/2014/main" id="{C5FF1AA2-ADE2-4FC7-A391-09D546636339}"/>
+              </a:ext>
+            </a:extLst>
+          </p:cNvPr>
+          <p:cNvSpPr>
+            <a:spLocks noGrp="1"/>
+          </p:cNvSpPr>
+          <p:nvPr>
+            <p:ph type="title"/>
+          </p:nvPr>
+        </p:nvSpPr>
+        <p:spPr/>
+        <p:txBody>
+          <a:bodyPr/>
+          <a:lstStyle/>
+          <a:p>
+            <a:r>
+              <a:rPr lang="en-US" dirty="0"/>
+              <a:t>Receiver Functions</a:t>
+            </a:r>
+          </a:p>
+        </p:txBody>
+      </p:sp>
+      <p:pic>
+        <p:nvPicPr>
+          <p:cNvPr id="5" name="Content Placeholder 4">
+            <a:extLst>
+              <a:ext uri="{FF2B5EF4-FFF2-40B4-BE49-F238E27FC236}">
+                <a16:creationId xmlns:a16="http://schemas.microsoft.com/office/drawing/2014/main" id="{3392ED91-354E-4C94-B8F9-2C4D4AF6EBE5}"/>
+              </a:ext>
+            </a:extLst>
+          </p:cNvPr>
+          <p:cNvPicPr>
+            <a:picLocks noGrp="1" noChangeAspect="1"/>
+          </p:cNvPicPr>
+          <p:nvPr>
+            <p:ph idx="1"/>
+          </p:nvPr>
+        </p:nvPicPr>
+        <p:blipFill>
+          <a:blip r:embed="rId2"/>
+          <a:stretch>
+            <a:fillRect/>
+          </a:stretch>
+        </p:blipFill>
+        <p:spPr>
+          <a:xfrm>
+            <a:off x="583660" y="3848780"/>
+            <a:ext cx="2286000" cy="2286000"/>
+          </a:xfrm>
+        </p:spPr>
+      </p:pic>
+      <p:pic>
+        <p:nvPicPr>
+          <p:cNvPr id="8" name="Picture 7">
+            <a:extLst>
+              <a:ext uri="{FF2B5EF4-FFF2-40B4-BE49-F238E27FC236}">
+                <a16:creationId xmlns:a16="http://schemas.microsoft.com/office/drawing/2014/main" id="{415E8C86-CADA-421C-9CF3-62B84E1A12C8}"/>
+              </a:ext>
+            </a:extLst>
+          </p:cNvPr>
+          <p:cNvPicPr>
+            <a:picLocks noChangeAspect="1"/>
+          </p:cNvPicPr>
+          <p:nvPr/>
+        </p:nvPicPr>
+        <p:blipFill>
+          <a:blip r:embed="rId3"/>
+          <a:stretch>
+            <a:fillRect/>
+          </a:stretch>
+        </p:blipFill>
+        <p:spPr>
+          <a:xfrm>
+            <a:off x="3712118" y="113498"/>
+            <a:ext cx="2748027" cy="6631003"/>
+          </a:xfrm>
+          <a:prstGeom prst="rect">
+            <a:avLst/>
+          </a:prstGeom>
+        </p:spPr>
+      </p:pic>
+      <p:pic>
+        <p:nvPicPr>
+          <p:cNvPr id="10" name="Picture 9">
+            <a:extLst>
+              <a:ext uri="{FF2B5EF4-FFF2-40B4-BE49-F238E27FC236}">
+                <a16:creationId xmlns:a16="http://schemas.microsoft.com/office/drawing/2014/main" id="{5ADC5F47-4377-4301-BF43-2416E0B36EA1}"/>
+              </a:ext>
+            </a:extLst>
+          </p:cNvPr>
+          <p:cNvPicPr>
+            <a:picLocks noChangeAspect="1"/>
+          </p:cNvPicPr>
+          <p:nvPr/>
+        </p:nvPicPr>
+        <p:blipFill>
+          <a:blip r:embed="rId4"/>
+          <a:stretch>
+            <a:fillRect/>
+          </a:stretch>
+        </p:blipFill>
+        <p:spPr>
+          <a:xfrm>
+            <a:off x="7268236" y="113498"/>
+            <a:ext cx="3310604" cy="6631003"/>
+          </a:xfrm>
+          <a:prstGeom prst="rect">
+            <a:avLst/>
+          </a:prstGeom>
+        </p:spPr>
+      </p:pic>
+    </p:spTree>
+    <p:extLst>
+      <p:ext uri="{BB962C8B-B14F-4D97-AF65-F5344CB8AC3E}">
+        <p14:creationId xmlns:p14="http://schemas.microsoft.com/office/powerpoint/2010/main" val="3135811306"/>
+      </p:ext>
+    </p:extLst>
+  </p:cSld>
+  <p:clrMapOvr>
+    <a:masterClrMapping/>
+  </p:clrMapOvr>
+</p:sld>
+</file>
+
 <file path=ppt/theme/theme1.xml><?xml version="1.0" encoding="utf-8"?>
 <a:theme xmlns:a="http://schemas.openxmlformats.org/drawingml/2006/main" name="Frame">
   <a:themeElements>

</xml_diff>